<commit_message>
add: some stuff in presentation
</commit_message>
<xml_diff>
--- a/Приложение Tonpad.pptx
+++ b/Приложение Tonpad.pptx
@@ -5016,19 +5016,7 @@
               <a:rPr lang="ru-RU" spc="-5" dirty="0">
                 <a:ea typeface="SimSun" panose="02010600030101010101" pitchFamily="2" charset="-122"/>
               </a:rPr>
-              <a:t> в 144 </a:t>
-            </a:r>
-            <a:r>
-              <a:rPr lang="ru-RU" spc="-5" dirty="0" err="1">
-                <a:ea typeface="SimSun" panose="02010600030101010101" pitchFamily="2" charset="-122"/>
-              </a:rPr>
-              <a:t>фпс</a:t>
-            </a:r>
-            <a:r>
-              <a:rPr lang="ru-RU" spc="-5" dirty="0">
-                <a:ea typeface="SimSun" panose="02010600030101010101" pitchFamily="2" charset="-122"/>
-              </a:rPr>
-              <a:t>.</a:t>
+              <a:t> .</a:t>
             </a:r>
           </a:p>
           <a:p>
@@ -8740,10 +8728,10 @@
       </p:sp>
       <p:pic>
         <p:nvPicPr>
-          <p:cNvPr id="4" name="Рисунок 3">
+          <p:cNvPr id="10" name="Рисунок 9">
             <a:extLst>
               <a:ext uri="{FF2B5EF4-FFF2-40B4-BE49-F238E27FC236}">
-                <a16:creationId xmlns:a16="http://schemas.microsoft.com/office/drawing/2014/main" id="{0CDADFA0-16B9-4859-9107-8E2803433C9C}"/>
+                <a16:creationId xmlns:a16="http://schemas.microsoft.com/office/drawing/2014/main" id="{EF105481-3FE2-4AF3-9569-CF47C0750419}"/>
               </a:ext>
             </a:extLst>
           </p:cNvPr>
@@ -8752,21 +8740,22 @@
           </p:cNvPicPr>
           <p:nvPr/>
         </p:nvPicPr>
-        <p:blipFill rotWithShape="1">
-          <a:blip r:embed="rId4" cstate="print">
+        <p:blipFill>
+          <a:blip r:embed="rId4">
             <a:extLst>
               <a:ext uri="{28A0092B-C50C-407E-A947-70E740481C1C}">
                 <a14:useLocalDpi xmlns:a14="http://schemas.microsoft.com/office/drawing/2010/main" val="0"/>
               </a:ext>
             </a:extLst>
           </a:blip>
-          <a:srcRect l="7125" r="37500"/>
-          <a:stretch/>
+          <a:stretch>
+            <a:fillRect/>
+          </a:stretch>
         </p:blipFill>
         <p:spPr>
           <a:xfrm>
-            <a:off x="3345174" y="1502751"/>
-            <a:ext cx="5501652" cy="4387206"/>
+            <a:off x="1175742" y="2071687"/>
+            <a:ext cx="9840516" cy="2714625"/>
           </a:xfrm>
           <a:prstGeom prst="rect">
             <a:avLst/>

</xml_diff>